<commit_message>
image cropping and size fixes
</commit_message>
<xml_diff>
--- a/post/engineering-culture-use-precise-language/Images.pptx
+++ b/post/engineering-culture-use-precise-language/Images.pptx
@@ -117,7 +117,7 @@
 <file path=ppt/revisionInfo.xml><?xml version="1.0" encoding="utf-8"?>
 <p1510:revInfo xmlns:a="http://schemas.openxmlformats.org/drawingml/2006/main" xmlns:r="http://schemas.openxmlformats.org/officeDocument/2006/relationships" xmlns:p1510="http://schemas.microsoft.com/office/powerpoint/2015/10/main">
   <p1510:revLst>
-    <p1510:client id="{E591304B-BCE9-4D36-9BE5-EA4161779B4C}" v="4" dt="2020-04-01T05:16:51.402"/>
+    <p1510:client id="{B547D3BE-3777-40C5-AF6C-6AAA463A98C6}" v="2" dt="2020-04-30T05:30:37.462"/>
   </p1510:revLst>
 </p1510:revInfo>
 </file>
@@ -391,6 +391,148 @@
       </pc:sldChg>
     </pc:docChg>
   </pc:docChgLst>
+  <pc:docChgLst>
+    <pc:chgData name="John Urbanek" userId="8f9b3a72876d9b56" providerId="LiveId" clId="{B547D3BE-3777-40C5-AF6C-6AAA463A98C6}"/>
+    <pc:docChg chg="undo custSel modSld">
+      <pc:chgData name="John Urbanek" userId="8f9b3a72876d9b56" providerId="LiveId" clId="{B547D3BE-3777-40C5-AF6C-6AAA463A98C6}" dt="2020-04-30T05:42:57.854" v="76" actId="1076"/>
+      <pc:docMkLst>
+        <pc:docMk/>
+      </pc:docMkLst>
+      <pc:sldChg chg="modSp mod">
+        <pc:chgData name="John Urbanek" userId="8f9b3a72876d9b56" providerId="LiveId" clId="{B547D3BE-3777-40C5-AF6C-6AAA463A98C6}" dt="2020-04-30T05:42:57.854" v="76" actId="1076"/>
+        <pc:sldMkLst>
+          <pc:docMk/>
+          <pc:sldMk cId="3639460913" sldId="261"/>
+        </pc:sldMkLst>
+        <pc:picChg chg="mod">
+          <ac:chgData name="John Urbanek" userId="8f9b3a72876d9b56" providerId="LiveId" clId="{B547D3BE-3777-40C5-AF6C-6AAA463A98C6}" dt="2020-04-30T05:42:57.854" v="76" actId="1076"/>
+          <ac:picMkLst>
+            <pc:docMk/>
+            <pc:sldMk cId="3639460913" sldId="261"/>
+            <ac:picMk id="4" creationId="{FF70A5F7-F4DB-498F-A9AD-C74AECC8F77F}"/>
+          </ac:picMkLst>
+        </pc:picChg>
+      </pc:sldChg>
+      <pc:sldChg chg="addSp delSp modSp mod">
+        <pc:chgData name="John Urbanek" userId="8f9b3a72876d9b56" providerId="LiveId" clId="{B547D3BE-3777-40C5-AF6C-6AAA463A98C6}" dt="2020-04-30T05:37:02.635" v="71" actId="164"/>
+        <pc:sldMkLst>
+          <pc:docMk/>
+          <pc:sldMk cId="1077476523" sldId="262"/>
+        </pc:sldMkLst>
+        <pc:spChg chg="mod topLvl">
+          <ac:chgData name="John Urbanek" userId="8f9b3a72876d9b56" providerId="LiveId" clId="{B547D3BE-3777-40C5-AF6C-6AAA463A98C6}" dt="2020-04-30T05:37:02.635" v="71" actId="164"/>
+          <ac:spMkLst>
+            <pc:docMk/>
+            <pc:sldMk cId="1077476523" sldId="262"/>
+            <ac:spMk id="2" creationId="{4ED47352-1FDE-4891-A62F-A80FF665808A}"/>
+          </ac:spMkLst>
+        </pc:spChg>
+        <pc:spChg chg="mod topLvl">
+          <ac:chgData name="John Urbanek" userId="8f9b3a72876d9b56" providerId="LiveId" clId="{B547D3BE-3777-40C5-AF6C-6AAA463A98C6}" dt="2020-04-30T05:37:02.635" v="71" actId="164"/>
+          <ac:spMkLst>
+            <pc:docMk/>
+            <pc:sldMk cId="1077476523" sldId="262"/>
+            <ac:spMk id="4" creationId="{F1C1C052-D01D-4185-A77B-A554B022AB6E}"/>
+          </ac:spMkLst>
+        </pc:spChg>
+        <pc:spChg chg="mod topLvl">
+          <ac:chgData name="John Urbanek" userId="8f9b3a72876d9b56" providerId="LiveId" clId="{B547D3BE-3777-40C5-AF6C-6AAA463A98C6}" dt="2020-04-30T05:37:02.635" v="71" actId="164"/>
+          <ac:spMkLst>
+            <pc:docMk/>
+            <pc:sldMk cId="1077476523" sldId="262"/>
+            <ac:spMk id="5" creationId="{9D3F1C78-3F97-4BE4-9DFB-A66823A95838}"/>
+          </ac:spMkLst>
+        </pc:spChg>
+        <pc:spChg chg="mod topLvl">
+          <ac:chgData name="John Urbanek" userId="8f9b3a72876d9b56" providerId="LiveId" clId="{B547D3BE-3777-40C5-AF6C-6AAA463A98C6}" dt="2020-04-30T05:37:02.635" v="71" actId="164"/>
+          <ac:spMkLst>
+            <pc:docMk/>
+            <pc:sldMk cId="1077476523" sldId="262"/>
+            <ac:spMk id="7" creationId="{7B4F038B-E30B-4795-84C4-C75C9E18444C}"/>
+          </ac:spMkLst>
+        </pc:spChg>
+        <pc:spChg chg="mod topLvl">
+          <ac:chgData name="John Urbanek" userId="8f9b3a72876d9b56" providerId="LiveId" clId="{B547D3BE-3777-40C5-AF6C-6AAA463A98C6}" dt="2020-04-30T05:37:02.635" v="71" actId="164"/>
+          <ac:spMkLst>
+            <pc:docMk/>
+            <pc:sldMk cId="1077476523" sldId="262"/>
+            <ac:spMk id="8" creationId="{58859D5A-BC5F-401C-8F5C-5EE64AAF81B4}"/>
+          </ac:spMkLst>
+        </pc:spChg>
+        <pc:spChg chg="mod topLvl">
+          <ac:chgData name="John Urbanek" userId="8f9b3a72876d9b56" providerId="LiveId" clId="{B547D3BE-3777-40C5-AF6C-6AAA463A98C6}" dt="2020-04-30T05:37:02.635" v="71" actId="164"/>
+          <ac:spMkLst>
+            <pc:docMk/>
+            <pc:sldMk cId="1077476523" sldId="262"/>
+            <ac:spMk id="9" creationId="{720D8B26-CE12-4419-A0B0-F59168EF1571}"/>
+          </ac:spMkLst>
+        </pc:spChg>
+        <pc:spChg chg="mod topLvl">
+          <ac:chgData name="John Urbanek" userId="8f9b3a72876d9b56" providerId="LiveId" clId="{B547D3BE-3777-40C5-AF6C-6AAA463A98C6}" dt="2020-04-30T05:37:02.635" v="71" actId="164"/>
+          <ac:spMkLst>
+            <pc:docMk/>
+            <pc:sldMk cId="1077476523" sldId="262"/>
+            <ac:spMk id="10" creationId="{D8BD2749-2982-4C40-86A0-6668DEF54374}"/>
+          </ac:spMkLst>
+        </pc:spChg>
+        <pc:spChg chg="mod topLvl">
+          <ac:chgData name="John Urbanek" userId="8f9b3a72876d9b56" providerId="LiveId" clId="{B547D3BE-3777-40C5-AF6C-6AAA463A98C6}" dt="2020-04-30T05:37:02.635" v="71" actId="164"/>
+          <ac:spMkLst>
+            <pc:docMk/>
+            <pc:sldMk cId="1077476523" sldId="262"/>
+            <ac:spMk id="11" creationId="{CD05C72D-DA09-48B1-AAF6-2AAC09F9CD0E}"/>
+          </ac:spMkLst>
+        </pc:spChg>
+        <pc:grpChg chg="add del mod">
+          <ac:chgData name="John Urbanek" userId="8f9b3a72876d9b56" providerId="LiveId" clId="{B547D3BE-3777-40C5-AF6C-6AAA463A98C6}" dt="2020-04-30T05:36:18.872" v="65" actId="165"/>
+          <ac:grpSpMkLst>
+            <pc:docMk/>
+            <pc:sldMk cId="1077476523" sldId="262"/>
+            <ac:grpSpMk id="3" creationId="{96D93090-D2D1-4BF9-8E00-7C1D85822D54}"/>
+          </ac:grpSpMkLst>
+        </pc:grpChg>
+        <pc:grpChg chg="add mod">
+          <ac:chgData name="John Urbanek" userId="8f9b3a72876d9b56" providerId="LiveId" clId="{B547D3BE-3777-40C5-AF6C-6AAA463A98C6}" dt="2020-04-30T05:36:40.024" v="67" actId="164"/>
+          <ac:grpSpMkLst>
+            <pc:docMk/>
+            <pc:sldMk cId="1077476523" sldId="262"/>
+            <ac:grpSpMk id="12" creationId="{1C400CC0-B322-4F8E-81F1-38E5417804DA}"/>
+          </ac:grpSpMkLst>
+        </pc:grpChg>
+        <pc:grpChg chg="add mod">
+          <ac:chgData name="John Urbanek" userId="8f9b3a72876d9b56" providerId="LiveId" clId="{B547D3BE-3777-40C5-AF6C-6AAA463A98C6}" dt="2020-04-30T05:37:02.635" v="71" actId="164"/>
+          <ac:grpSpMkLst>
+            <pc:docMk/>
+            <pc:sldMk cId="1077476523" sldId="262"/>
+            <ac:grpSpMk id="13" creationId="{217B1832-B054-48A1-9B34-AD81FCC1EC4A}"/>
+          </ac:grpSpMkLst>
+        </pc:grpChg>
+        <pc:picChg chg="mod topLvl modCrop">
+          <ac:chgData name="John Urbanek" userId="8f9b3a72876d9b56" providerId="LiveId" clId="{B547D3BE-3777-40C5-AF6C-6AAA463A98C6}" dt="2020-04-30T05:37:02.635" v="71" actId="164"/>
+          <ac:picMkLst>
+            <pc:docMk/>
+            <pc:sldMk cId="1077476523" sldId="262"/>
+            <ac:picMk id="6" creationId="{76E469D0-7BB3-4CDF-856E-59455CFC98B1}"/>
+          </ac:picMkLst>
+        </pc:picChg>
+      </pc:sldChg>
+      <pc:sldChg chg="modSp mod">
+        <pc:chgData name="John Urbanek" userId="8f9b3a72876d9b56" providerId="LiveId" clId="{B547D3BE-3777-40C5-AF6C-6AAA463A98C6}" dt="2020-04-30T05:39:39.761" v="74" actId="14100"/>
+        <pc:sldMkLst>
+          <pc:docMk/>
+          <pc:sldMk cId="112481832" sldId="263"/>
+        </pc:sldMkLst>
+        <pc:picChg chg="mod">
+          <ac:chgData name="John Urbanek" userId="8f9b3a72876d9b56" providerId="LiveId" clId="{B547D3BE-3777-40C5-AF6C-6AAA463A98C6}" dt="2020-04-30T05:39:39.761" v="74" actId="14100"/>
+          <ac:picMkLst>
+            <pc:docMk/>
+            <pc:sldMk cId="112481832" sldId="263"/>
+            <ac:picMk id="19" creationId="{61F3AF4C-3415-42A1-85C9-B71962F12226}"/>
+          </ac:picMkLst>
+        </pc:picChg>
+      </pc:sldChg>
+    </pc:docChg>
+  </pc:docChgLst>
 </pc:chgInfo>
 </file>
 
@@ -541,7 +683,7 @@
           <a:p>
             <a:fld id="{5BAA8C80-3012-4F6A-9B29-A620FA95A568}" type="datetimeFigureOut">
               <a:rPr lang="en-US" smtClean="0"/>
-              <a:t>4/1/2020</a:t>
+              <a:t>4/30/2020</a:t>
             </a:fld>
             <a:endParaRPr lang="en-US"/>
           </a:p>
@@ -739,7 +881,7 @@
           <a:p>
             <a:fld id="{5BAA8C80-3012-4F6A-9B29-A620FA95A568}" type="datetimeFigureOut">
               <a:rPr lang="en-US" smtClean="0"/>
-              <a:t>4/1/2020</a:t>
+              <a:t>4/30/2020</a:t>
             </a:fld>
             <a:endParaRPr lang="en-US"/>
           </a:p>
@@ -947,7 +1089,7 @@
           <a:p>
             <a:fld id="{5BAA8C80-3012-4F6A-9B29-A620FA95A568}" type="datetimeFigureOut">
               <a:rPr lang="en-US" smtClean="0"/>
-              <a:t>4/1/2020</a:t>
+              <a:t>4/30/2020</a:t>
             </a:fld>
             <a:endParaRPr lang="en-US"/>
           </a:p>
@@ -1145,7 +1287,7 @@
           <a:p>
             <a:fld id="{5BAA8C80-3012-4F6A-9B29-A620FA95A568}" type="datetimeFigureOut">
               <a:rPr lang="en-US" smtClean="0"/>
-              <a:t>4/1/2020</a:t>
+              <a:t>4/30/2020</a:t>
             </a:fld>
             <a:endParaRPr lang="en-US"/>
           </a:p>
@@ -1420,7 +1562,7 @@
           <a:p>
             <a:fld id="{5BAA8C80-3012-4F6A-9B29-A620FA95A568}" type="datetimeFigureOut">
               <a:rPr lang="en-US" smtClean="0"/>
-              <a:t>4/1/2020</a:t>
+              <a:t>4/30/2020</a:t>
             </a:fld>
             <a:endParaRPr lang="en-US"/>
           </a:p>
@@ -1685,7 +1827,7 @@
           <a:p>
             <a:fld id="{5BAA8C80-3012-4F6A-9B29-A620FA95A568}" type="datetimeFigureOut">
               <a:rPr lang="en-US" smtClean="0"/>
-              <a:t>4/1/2020</a:t>
+              <a:t>4/30/2020</a:t>
             </a:fld>
             <a:endParaRPr lang="en-US"/>
           </a:p>
@@ -2097,7 +2239,7 @@
           <a:p>
             <a:fld id="{5BAA8C80-3012-4F6A-9B29-A620FA95A568}" type="datetimeFigureOut">
               <a:rPr lang="en-US" smtClean="0"/>
-              <a:t>4/1/2020</a:t>
+              <a:t>4/30/2020</a:t>
             </a:fld>
             <a:endParaRPr lang="en-US"/>
           </a:p>
@@ -2238,7 +2380,7 @@
           <a:p>
             <a:fld id="{5BAA8C80-3012-4F6A-9B29-A620FA95A568}" type="datetimeFigureOut">
               <a:rPr lang="en-US" smtClean="0"/>
-              <a:t>4/1/2020</a:t>
+              <a:t>4/30/2020</a:t>
             </a:fld>
             <a:endParaRPr lang="en-US"/>
           </a:p>
@@ -2351,7 +2493,7 @@
           <a:p>
             <a:fld id="{5BAA8C80-3012-4F6A-9B29-A620FA95A568}" type="datetimeFigureOut">
               <a:rPr lang="en-US" smtClean="0"/>
-              <a:t>4/1/2020</a:t>
+              <a:t>4/30/2020</a:t>
             </a:fld>
             <a:endParaRPr lang="en-US"/>
           </a:p>
@@ -2662,7 +2804,7 @@
           <a:p>
             <a:fld id="{5BAA8C80-3012-4F6A-9B29-A620FA95A568}" type="datetimeFigureOut">
               <a:rPr lang="en-US" smtClean="0"/>
-              <a:t>4/1/2020</a:t>
+              <a:t>4/30/2020</a:t>
             </a:fld>
             <a:endParaRPr lang="en-US"/>
           </a:p>
@@ -2950,7 +3092,7 @@
           <a:p>
             <a:fld id="{5BAA8C80-3012-4F6A-9B29-A620FA95A568}" type="datetimeFigureOut">
               <a:rPr lang="en-US" smtClean="0"/>
-              <a:t>4/1/2020</a:t>
+              <a:t>4/30/2020</a:t>
             </a:fld>
             <a:endParaRPr lang="en-US"/>
           </a:p>
@@ -3191,7 +3333,7 @@
           <a:p>
             <a:fld id="{5BAA8C80-3012-4F6A-9B29-A620FA95A568}" type="datetimeFigureOut">
               <a:rPr lang="en-US" smtClean="0"/>
-              <a:t>4/1/2020</a:t>
+              <a:t>4/30/2020</a:t>
             </a:fld>
             <a:endParaRPr lang="en-US"/>
           </a:p>
@@ -3645,19 +3787,13 @@
         </p:blipFill>
         <p:spPr>
           <a:xfrm>
-            <a:off x="2500312" y="1404937"/>
-            <a:ext cx="7191375" cy="4048125"/>
+            <a:off x="1868545" y="748147"/>
+            <a:ext cx="8801165" cy="4954298"/>
           </a:xfrm>
           <a:prstGeom prst="rect">
             <a:avLst/>
           </a:prstGeom>
-          <a:effectLst>
-            <a:outerShdw blurRad="292100" dist="139700" dir="2700000" algn="tl" rotWithShape="0">
-              <a:prstClr val="black">
-                <a:alpha val="65000"/>
-              </a:prstClr>
-            </a:outerShdw>
-          </a:effectLst>
+          <a:effectLst/>
         </p:spPr>
       </p:pic>
     </p:spTree>
@@ -3692,10 +3828,10 @@
       </p:grpSpPr>
       <p:grpSp>
         <p:nvGrpSpPr>
-          <p:cNvPr id="3" name="Group 2">
-            <a:extLst>
-              <a:ext uri="{FF2B5EF4-FFF2-40B4-BE49-F238E27FC236}">
-                <a16:creationId xmlns:a16="http://schemas.microsoft.com/office/drawing/2014/main" id="{96D93090-D2D1-4BF9-8E00-7C1D85822D54}"/>
+          <p:cNvPr id="13" name="Group 12">
+            <a:extLst>
+              <a:ext uri="{FF2B5EF4-FFF2-40B4-BE49-F238E27FC236}">
+                <a16:creationId xmlns:a16="http://schemas.microsoft.com/office/drawing/2014/main" id="{217B1832-B054-48A1-9B34-AD81FCC1EC4A}"/>
               </a:ext>
             </a:extLst>
           </p:cNvPr>
@@ -3704,10 +3840,10 @@
         </p:nvGrpSpPr>
         <p:grpSpPr>
           <a:xfrm>
-            <a:off x="2245303" y="1514475"/>
-            <a:ext cx="6153057" cy="3829050"/>
-            <a:chOff x="2245303" y="1514475"/>
-            <a:chExt cx="6153057" cy="3829050"/>
+            <a:off x="1545494" y="411480"/>
+            <a:ext cx="9517956" cy="6035040"/>
+            <a:chOff x="1545494" y="411480"/>
+            <a:chExt cx="9517956" cy="6035040"/>
           </a:xfrm>
         </p:grpSpPr>
         <p:pic>
@@ -3738,22 +3874,12 @@
           </p:blipFill>
           <p:spPr>
             <a:xfrm>
-              <a:off x="2245303" y="1514475"/>
-              <a:ext cx="6038850" cy="3829050"/>
+              <a:off x="1545494" y="411480"/>
+              <a:ext cx="9517956" cy="6035040"/>
             </a:xfrm>
             <a:prstGeom prst="rect">
               <a:avLst/>
             </a:prstGeom>
-            <a:ln>
-              <a:noFill/>
-            </a:ln>
-            <a:effectLst>
-              <a:outerShdw blurRad="292100" dist="139700" dir="2700000" algn="tl" rotWithShape="0">
-                <a:srgbClr val="333333">
-                  <a:alpha val="65000"/>
-                </a:srgbClr>
-              </a:outerShdw>
-            </a:effectLst>
           </p:spPr>
         </p:pic>
         <p:sp>
@@ -3770,8 +3896,8 @@
           </p:nvSpPr>
           <p:spPr>
             <a:xfrm rot="21184029">
-              <a:off x="7348815" y="3984890"/>
-              <a:ext cx="573402" cy="369332"/>
+              <a:off x="9589244" y="4305149"/>
+              <a:ext cx="903751" cy="369332"/>
             </a:xfrm>
             <a:prstGeom prst="rect">
               <a:avLst/>
@@ -3807,8 +3933,8 @@
           </p:nvSpPr>
           <p:spPr>
             <a:xfrm rot="21250362">
-              <a:off x="6118592" y="3997696"/>
-              <a:ext cx="569378" cy="369332"/>
+              <a:off x="7650265" y="4325333"/>
+              <a:ext cx="897408" cy="369332"/>
             </a:xfrm>
             <a:prstGeom prst="rect">
               <a:avLst/>
@@ -3844,8 +3970,8 @@
           </p:nvSpPr>
           <p:spPr>
             <a:xfrm rot="21231949">
-              <a:off x="6460454" y="4037587"/>
-              <a:ext cx="349857" cy="369332"/>
+              <a:off x="8189080" y="4388206"/>
+              <a:ext cx="551417" cy="369332"/>
             </a:xfrm>
             <a:prstGeom prst="rect">
               <a:avLst/>
@@ -3881,8 +4007,8 @@
           </p:nvSpPr>
           <p:spPr>
             <a:xfrm rot="21184029">
-              <a:off x="6423166" y="3814561"/>
-              <a:ext cx="657952" cy="369332"/>
+              <a:off x="8130310" y="4036690"/>
+              <a:ext cx="1037012" cy="369332"/>
             </a:xfrm>
             <a:prstGeom prst="rect">
               <a:avLst/>
@@ -3918,8 +4044,8 @@
           </p:nvSpPr>
           <p:spPr>
             <a:xfrm rot="21184029">
-              <a:off x="7272733" y="3802021"/>
-              <a:ext cx="426722" cy="369332"/>
+              <a:off x="9469330" y="4016926"/>
+              <a:ext cx="672565" cy="369332"/>
             </a:xfrm>
             <a:prstGeom prst="rect">
               <a:avLst/>
@@ -3955,8 +4081,8 @@
           </p:nvSpPr>
           <p:spPr>
             <a:xfrm rot="21184029">
-              <a:off x="7740408" y="3788066"/>
-              <a:ext cx="657952" cy="369332"/>
+              <a:off x="10208149" y="4023120"/>
+              <a:ext cx="569947" cy="369332"/>
             </a:xfrm>
             <a:prstGeom prst="rect">
               <a:avLst/>
@@ -3992,8 +4118,8 @@
           </p:nvSpPr>
           <p:spPr>
             <a:xfrm rot="21250362">
-              <a:off x="6875968" y="3885311"/>
-              <a:ext cx="569378" cy="369332"/>
+              <a:off x="8843981" y="4148201"/>
+              <a:ext cx="897408" cy="369332"/>
             </a:xfrm>
             <a:prstGeom prst="rect">
               <a:avLst/>
@@ -4029,8 +4155,8 @@
           </p:nvSpPr>
           <p:spPr>
             <a:xfrm>
-              <a:off x="5125829" y="1862051"/>
-              <a:ext cx="2447065" cy="598516"/>
+              <a:off x="6085550" y="959301"/>
+              <a:ext cx="3856870" cy="943333"/>
             </a:xfrm>
             <a:prstGeom prst="wedgeRoundRectCallout">
               <a:avLst>
@@ -4061,15 +4187,7 @@
               <a:pPr algn="ctr"/>
               <a:r>
                 <a:rPr lang="en-US" sz="1600" dirty="0"/>
-                <a:t>They </a:t>
-              </a:r>
-              <a:r>
-                <a:rPr lang="en-US" sz="1600"/>
-                <a:t>drew first ambiguous antecedents, </a:t>
-              </a:r>
-              <a:r>
-                <a:rPr lang="en-US" sz="1600" dirty="0"/>
-                <a:t>not me!</a:t>
+                <a:t>They drew first ambiguous antecedents, not me!</a:t>
               </a:r>
             </a:p>
           </p:txBody>
@@ -4145,19 +4263,13 @@
         </p:blipFill>
         <p:spPr>
           <a:xfrm>
-            <a:off x="2518099" y="1043732"/>
-            <a:ext cx="7155802" cy="4770535"/>
+            <a:off x="1280160" y="144549"/>
+            <a:ext cx="9742516" cy="6495011"/>
           </a:xfrm>
           <a:prstGeom prst="rect">
             <a:avLst/>
           </a:prstGeom>
-          <a:effectLst>
-            <a:outerShdw blurRad="292100" dist="139700" dir="2700000" algn="tl" rotWithShape="0">
-              <a:prstClr val="black">
-                <a:alpha val="65000"/>
-              </a:prstClr>
-            </a:outerShdw>
-          </a:effectLst>
+          <a:effectLst/>
         </p:spPr>
       </p:pic>
     </p:spTree>

</xml_diff>